<commit_message>
Länkar till relaterat material
</commit_message>
<xml_diff>
--- a/to-me-images.pptx
+++ b/to-me-images.pptx
@@ -5,11 +5,12 @@
     <p:sldMasterId id="2147483648" r:id="rId1"/>
   </p:sldMasterIdLst>
   <p:notesMasterIdLst>
-    <p:notesMasterId r:id="rId4"/>
+    <p:notesMasterId r:id="rId5"/>
   </p:notesMasterIdLst>
   <p:sldIdLst>
     <p:sldId id="256" r:id="rId2"/>
     <p:sldId id="257" r:id="rId3"/>
+    <p:sldId id="258" r:id="rId4"/>
   </p:sldIdLst>
   <p:sldSz cx="12192000" cy="6858000"/>
   <p:notesSz cx="6858000" cy="9144000"/>
@@ -202,7 +203,7 @@
           <a:p>
             <a:fld id="{A4934818-65A8-4090-AE03-47250CAFA2C4}" type="datetimeFigureOut">
               <a:rPr lang="sv-SE" smtClean="0"/>
-              <a:t>2017-11-27</a:t>
+              <a:t>2017-12-04</a:t>
             </a:fld>
             <a:endParaRPr lang="sv-SE"/>
           </a:p>
@@ -619,7 +620,7 @@
           <a:p>
             <a:fld id="{586E13D5-D7B9-41C0-AC65-99C375944FAF}" type="datetimeFigureOut">
               <a:rPr lang="sv-SE" smtClean="0"/>
-              <a:t>2017-11-27</a:t>
+              <a:t>2017-12-04</a:t>
             </a:fld>
             <a:endParaRPr lang="sv-SE"/>
           </a:p>
@@ -819,7 +820,7 @@
           <a:p>
             <a:fld id="{586E13D5-D7B9-41C0-AC65-99C375944FAF}" type="datetimeFigureOut">
               <a:rPr lang="sv-SE" smtClean="0"/>
-              <a:t>2017-11-27</a:t>
+              <a:t>2017-12-04</a:t>
             </a:fld>
             <a:endParaRPr lang="sv-SE"/>
           </a:p>
@@ -1029,7 +1030,7 @@
           <a:p>
             <a:fld id="{586E13D5-D7B9-41C0-AC65-99C375944FAF}" type="datetimeFigureOut">
               <a:rPr lang="sv-SE" smtClean="0"/>
-              <a:t>2017-11-27</a:t>
+              <a:t>2017-12-04</a:t>
             </a:fld>
             <a:endParaRPr lang="sv-SE"/>
           </a:p>
@@ -1229,7 +1230,7 @@
           <a:p>
             <a:fld id="{586E13D5-D7B9-41C0-AC65-99C375944FAF}" type="datetimeFigureOut">
               <a:rPr lang="sv-SE" smtClean="0"/>
-              <a:t>2017-11-27</a:t>
+              <a:t>2017-12-04</a:t>
             </a:fld>
             <a:endParaRPr lang="sv-SE"/>
           </a:p>
@@ -1505,7 +1506,7 @@
           <a:p>
             <a:fld id="{586E13D5-D7B9-41C0-AC65-99C375944FAF}" type="datetimeFigureOut">
               <a:rPr lang="sv-SE" smtClean="0"/>
-              <a:t>2017-11-27</a:t>
+              <a:t>2017-12-04</a:t>
             </a:fld>
             <a:endParaRPr lang="sv-SE"/>
           </a:p>
@@ -1773,7 +1774,7 @@
           <a:p>
             <a:fld id="{586E13D5-D7B9-41C0-AC65-99C375944FAF}" type="datetimeFigureOut">
               <a:rPr lang="sv-SE" smtClean="0"/>
-              <a:t>2017-11-27</a:t>
+              <a:t>2017-12-04</a:t>
             </a:fld>
             <a:endParaRPr lang="sv-SE"/>
           </a:p>
@@ -2188,7 +2189,7 @@
           <a:p>
             <a:fld id="{586E13D5-D7B9-41C0-AC65-99C375944FAF}" type="datetimeFigureOut">
               <a:rPr lang="sv-SE" smtClean="0"/>
-              <a:t>2017-11-27</a:t>
+              <a:t>2017-12-04</a:t>
             </a:fld>
             <a:endParaRPr lang="sv-SE"/>
           </a:p>
@@ -2330,7 +2331,7 @@
           <a:p>
             <a:fld id="{586E13D5-D7B9-41C0-AC65-99C375944FAF}" type="datetimeFigureOut">
               <a:rPr lang="sv-SE" smtClean="0"/>
-              <a:t>2017-11-27</a:t>
+              <a:t>2017-12-04</a:t>
             </a:fld>
             <a:endParaRPr lang="sv-SE"/>
           </a:p>
@@ -2443,7 +2444,7 @@
           <a:p>
             <a:fld id="{586E13D5-D7B9-41C0-AC65-99C375944FAF}" type="datetimeFigureOut">
               <a:rPr lang="sv-SE" smtClean="0"/>
-              <a:t>2017-11-27</a:t>
+              <a:t>2017-12-04</a:t>
             </a:fld>
             <a:endParaRPr lang="sv-SE"/>
           </a:p>
@@ -2756,7 +2757,7 @@
           <a:p>
             <a:fld id="{586E13D5-D7B9-41C0-AC65-99C375944FAF}" type="datetimeFigureOut">
               <a:rPr lang="sv-SE" smtClean="0"/>
-              <a:t>2017-11-27</a:t>
+              <a:t>2017-12-04</a:t>
             </a:fld>
             <a:endParaRPr lang="sv-SE"/>
           </a:p>
@@ -3045,7 +3046,7 @@
           <a:p>
             <a:fld id="{586E13D5-D7B9-41C0-AC65-99C375944FAF}" type="datetimeFigureOut">
               <a:rPr lang="sv-SE" smtClean="0"/>
-              <a:t>2017-11-27</a:t>
+              <a:t>2017-12-04</a:t>
             </a:fld>
             <a:endParaRPr lang="sv-SE"/>
           </a:p>
@@ -3288,7 +3289,7 @@
           <a:p>
             <a:fld id="{586E13D5-D7B9-41C0-AC65-99C375944FAF}" type="datetimeFigureOut">
               <a:rPr lang="sv-SE" smtClean="0"/>
-              <a:t>2017-11-27</a:t>
+              <a:t>2017-12-04</a:t>
             </a:fld>
             <a:endParaRPr lang="sv-SE"/>
           </a:p>
@@ -4867,6 +4868,1064 @@
     <p:extLst>
       <p:ext uri="{BB962C8B-B14F-4D97-AF65-F5344CB8AC3E}">
         <p14:creationId xmlns:p14="http://schemas.microsoft.com/office/powerpoint/2010/main" val="3398213930"/>
+      </p:ext>
+    </p:extLst>
+  </p:cSld>
+  <p:clrMapOvr>
+    <a:masterClrMapping/>
+  </p:clrMapOvr>
+</p:sld>
+</file>
+
+<file path=ppt/slides/slide3.xml><?xml version="1.0" encoding="utf-8"?>
+<p:sld xmlns:a="http://schemas.openxmlformats.org/drawingml/2006/main" xmlns:r="http://schemas.openxmlformats.org/officeDocument/2006/relationships" xmlns:p="http://schemas.openxmlformats.org/presentationml/2006/main">
+  <p:cSld>
+    <p:spTree>
+      <p:nvGrpSpPr>
+        <p:cNvPr id="1" name=""/>
+        <p:cNvGrpSpPr/>
+        <p:nvPr/>
+      </p:nvGrpSpPr>
+      <p:grpSpPr>
+        <a:xfrm>
+          <a:off x="0" y="0"/>
+          <a:ext cx="0" cy="0"/>
+          <a:chOff x="0" y="0"/>
+          <a:chExt cx="0" cy="0"/>
+        </a:xfrm>
+      </p:grpSpPr>
+      <p:grpSp>
+        <p:nvGrpSpPr>
+          <p:cNvPr id="10" name="Group 9">
+            <a:extLst>
+              <a:ext uri="{FF2B5EF4-FFF2-40B4-BE49-F238E27FC236}">
+                <a16:creationId xmlns:a16="http://schemas.microsoft.com/office/drawing/2014/main" id="{1E54C7C3-7534-4405-9880-E76ECD5402CA}"/>
+              </a:ext>
+            </a:extLst>
+          </p:cNvPr>
+          <p:cNvGrpSpPr/>
+          <p:nvPr/>
+        </p:nvGrpSpPr>
+        <p:grpSpPr>
+          <a:xfrm>
+            <a:off x="4922576" y="4545253"/>
+            <a:ext cx="1173424" cy="1173424"/>
+            <a:chOff x="2347247" y="4009734"/>
+            <a:chExt cx="1173424" cy="1173424"/>
+          </a:xfrm>
+        </p:grpSpPr>
+        <p:sp>
+          <p:nvSpPr>
+            <p:cNvPr id="11" name="Oval 10">
+              <a:extLst>
+                <a:ext uri="{FF2B5EF4-FFF2-40B4-BE49-F238E27FC236}">
+                  <a16:creationId xmlns:a16="http://schemas.microsoft.com/office/drawing/2014/main" id="{00AD79ED-281B-41EB-88D9-289A22C4C2DC}"/>
+                </a:ext>
+              </a:extLst>
+            </p:cNvPr>
+            <p:cNvSpPr/>
+            <p:nvPr/>
+          </p:nvSpPr>
+          <p:spPr>
+            <a:xfrm>
+              <a:off x="2347247" y="4009734"/>
+              <a:ext cx="1173424" cy="1173424"/>
+            </a:xfrm>
+            <a:prstGeom prst="ellipse">
+              <a:avLst/>
+            </a:prstGeom>
+            <a:solidFill>
+              <a:srgbClr val="155997"/>
+            </a:solidFill>
+            <a:ln>
+              <a:noFill/>
+            </a:ln>
+          </p:spPr>
+          <p:style>
+            <a:lnRef idx="2">
+              <a:schemeClr val="accent1">
+                <a:shade val="50000"/>
+              </a:schemeClr>
+            </a:lnRef>
+            <a:fillRef idx="1">
+              <a:schemeClr val="accent1"/>
+            </a:fillRef>
+            <a:effectRef idx="0">
+              <a:schemeClr val="accent1"/>
+            </a:effectRef>
+            <a:fontRef idx="minor">
+              <a:schemeClr val="lt1"/>
+            </a:fontRef>
+          </p:style>
+          <p:txBody>
+            <a:bodyPr rtlCol="0" anchor="ctr"/>
+            <a:lstStyle/>
+            <a:p>
+              <a:pPr algn="ctr"/>
+              <a:endParaRPr lang="sv-SE"/>
+            </a:p>
+          </p:txBody>
+        </p:sp>
+        <p:pic>
+          <p:nvPicPr>
+            <p:cNvPr id="12" name="Graphic 11" descr="Children">
+              <a:extLst>
+                <a:ext uri="{FF2B5EF4-FFF2-40B4-BE49-F238E27FC236}">
+                  <a16:creationId xmlns:a16="http://schemas.microsoft.com/office/drawing/2014/main" id="{DBEB0050-06CF-4262-9974-48AFBB34694D}"/>
+                </a:ext>
+              </a:extLst>
+            </p:cNvPr>
+            <p:cNvPicPr>
+              <a:picLocks noChangeAspect="1"/>
+            </p:cNvPicPr>
+            <p:nvPr/>
+          </p:nvPicPr>
+          <p:blipFill>
+            <a:blip r:embed="rId2">
+              <a:extLst>
+                <a:ext uri="{28A0092B-C50C-407E-A947-70E740481C1C}">
+                  <a14:useLocalDpi xmlns:a14="http://schemas.microsoft.com/office/drawing/2010/main" val="0"/>
+                </a:ext>
+                <a:ext uri="{96DAC541-7B7A-43D3-8B79-37D633B846F1}">
+                  <asvg:svgBlip xmlns:asvg="http://schemas.microsoft.com/office/drawing/2016/SVG/main" r:embed="rId3"/>
+                </a:ext>
+              </a:extLst>
+            </a:blip>
+            <a:stretch>
+              <a:fillRect/>
+            </a:stretch>
+          </p:blipFill>
+          <p:spPr>
+            <a:xfrm>
+              <a:off x="2476547" y="4064962"/>
+              <a:ext cx="914400" cy="914400"/>
+            </a:xfrm>
+            <a:prstGeom prst="rect">
+              <a:avLst/>
+            </a:prstGeom>
+          </p:spPr>
+        </p:pic>
+        <p:sp>
+          <p:nvSpPr>
+            <p:cNvPr id="13" name="TextBox 12">
+              <a:extLst>
+                <a:ext uri="{FF2B5EF4-FFF2-40B4-BE49-F238E27FC236}">
+                  <a16:creationId xmlns:a16="http://schemas.microsoft.com/office/drawing/2014/main" id="{FD5D92AB-39B7-407D-BF71-7B27E298960F}"/>
+                </a:ext>
+              </a:extLst>
+            </p:cNvPr>
+            <p:cNvSpPr txBox="1"/>
+            <p:nvPr/>
+          </p:nvSpPr>
+          <p:spPr>
+            <a:xfrm>
+              <a:off x="2347247" y="4714192"/>
+              <a:ext cx="1173424" cy="369332"/>
+            </a:xfrm>
+            <a:prstGeom prst="rect">
+              <a:avLst/>
+            </a:prstGeom>
+            <a:noFill/>
+          </p:spPr>
+          <p:txBody>
+            <a:bodyPr wrap="square" rtlCol="0">
+              <a:spAutoFit/>
+            </a:bodyPr>
+            <a:lstStyle/>
+            <a:p>
+              <a:pPr algn="ctr"/>
+              <a:r>
+                <a:rPr lang="en-US" dirty="0">
+                  <a:solidFill>
+                    <a:schemeClr val="bg1"/>
+                  </a:solidFill>
+                  <a:latin typeface="Microsoft YaHei UI Light" panose="020B0502040204020203" pitchFamily="34" charset="-122"/>
+                  <a:ea typeface="Microsoft YaHei UI Light" panose="020B0502040204020203" pitchFamily="34" charset="-122"/>
+                </a:rPr>
+                <a:t>#</a:t>
+              </a:r>
+              <a:r>
+                <a:rPr lang="en-US" dirty="0" err="1">
+                  <a:solidFill>
+                    <a:schemeClr val="bg1"/>
+                  </a:solidFill>
+                  <a:latin typeface="Microsoft YaHei UI Light" panose="020B0502040204020203" pitchFamily="34" charset="-122"/>
+                  <a:ea typeface="Microsoft YaHei UI Light" panose="020B0502040204020203" pitchFamily="34" charset="-122"/>
+                </a:rPr>
+                <a:t>ToMe</a:t>
+              </a:r>
+              <a:endParaRPr lang="sv-SE" dirty="0">
+                <a:solidFill>
+                  <a:schemeClr val="bg1"/>
+                </a:solidFill>
+                <a:latin typeface="Microsoft YaHei UI Light" panose="020B0502040204020203" pitchFamily="34" charset="-122"/>
+                <a:ea typeface="Microsoft YaHei UI Light" panose="020B0502040204020203" pitchFamily="34" charset="-122"/>
+              </a:endParaRPr>
+            </a:p>
+          </p:txBody>
+        </p:sp>
+      </p:grpSp>
+      <p:sp>
+        <p:nvSpPr>
+          <p:cNvPr id="14" name="TextBox 13">
+            <a:extLst>
+              <a:ext uri="{FF2B5EF4-FFF2-40B4-BE49-F238E27FC236}">
+                <a16:creationId xmlns:a16="http://schemas.microsoft.com/office/drawing/2014/main" id="{730D5A3D-506D-4882-9155-17B6084804B9}"/>
+              </a:ext>
+            </a:extLst>
+          </p:cNvPr>
+          <p:cNvSpPr txBox="1"/>
+          <p:nvPr/>
+        </p:nvSpPr>
+        <p:spPr>
+          <a:xfrm>
+            <a:off x="8569436" y="4799604"/>
+            <a:ext cx="1774204" cy="369332"/>
+          </a:xfrm>
+          <a:prstGeom prst="rect">
+            <a:avLst/>
+          </a:prstGeom>
+          <a:noFill/>
+        </p:spPr>
+        <p:txBody>
+          <a:bodyPr wrap="none" rtlCol="0">
+            <a:spAutoFit/>
+          </a:bodyPr>
+          <a:lstStyle/>
+          <a:p>
+            <a:r>
+              <a:rPr lang="en-US" dirty="0" err="1"/>
+              <a:t>Påverka</a:t>
+            </a:r>
+            <a:r>
+              <a:rPr lang="en-US" dirty="0"/>
+              <a:t> </a:t>
+            </a:r>
+            <a:r>
+              <a:rPr lang="en-US" dirty="0" err="1"/>
+              <a:t>attityder</a:t>
+            </a:r>
+            <a:endParaRPr lang="sv-SE" dirty="0"/>
+          </a:p>
+        </p:txBody>
+      </p:sp>
+      <p:sp>
+        <p:nvSpPr>
+          <p:cNvPr id="22" name="TextBox 21">
+            <a:extLst>
+              <a:ext uri="{FF2B5EF4-FFF2-40B4-BE49-F238E27FC236}">
+                <a16:creationId xmlns:a16="http://schemas.microsoft.com/office/drawing/2014/main" id="{166E497E-2556-43B1-B3F5-2069F9D47A0F}"/>
+              </a:ext>
+            </a:extLst>
+          </p:cNvPr>
+          <p:cNvSpPr txBox="1"/>
+          <p:nvPr/>
+        </p:nvSpPr>
+        <p:spPr>
+          <a:xfrm>
+            <a:off x="7806054" y="5249711"/>
+            <a:ext cx="3742948" cy="369332"/>
+          </a:xfrm>
+          <a:prstGeom prst="rect">
+            <a:avLst/>
+          </a:prstGeom>
+          <a:noFill/>
+        </p:spPr>
+        <p:txBody>
+          <a:bodyPr wrap="none" rtlCol="0">
+            <a:spAutoFit/>
+          </a:bodyPr>
+          <a:lstStyle/>
+          <a:p>
+            <a:r>
+              <a:rPr lang="en-US" dirty="0" err="1"/>
+              <a:t>Få</a:t>
+            </a:r>
+            <a:r>
+              <a:rPr lang="en-US" dirty="0"/>
+              <a:t> </a:t>
+            </a:r>
+            <a:r>
+              <a:rPr lang="en-US" dirty="0" err="1"/>
+              <a:t>bort</a:t>
+            </a:r>
+            <a:r>
+              <a:rPr lang="en-US" dirty="0"/>
+              <a:t> </a:t>
+            </a:r>
+            <a:r>
+              <a:rPr lang="en-US" dirty="0" err="1"/>
+              <a:t>skadliga</a:t>
+            </a:r>
+            <a:r>
+              <a:rPr lang="en-US" dirty="0"/>
+              <a:t>, </a:t>
+            </a:r>
+            <a:r>
+              <a:rPr lang="en-US" dirty="0" err="1"/>
+              <a:t>stereotypa</a:t>
+            </a:r>
+            <a:r>
+              <a:rPr lang="en-US" dirty="0"/>
+              <a:t> </a:t>
+            </a:r>
+            <a:r>
+              <a:rPr lang="en-US" dirty="0" err="1"/>
+              <a:t>könsroller</a:t>
+            </a:r>
+            <a:endParaRPr lang="sv-SE" dirty="0"/>
+          </a:p>
+        </p:txBody>
+      </p:sp>
+      <p:sp>
+        <p:nvSpPr>
+          <p:cNvPr id="26" name="TextBox 25">
+            <a:extLst>
+              <a:ext uri="{FF2B5EF4-FFF2-40B4-BE49-F238E27FC236}">
+                <a16:creationId xmlns:a16="http://schemas.microsoft.com/office/drawing/2014/main" id="{6B448F0D-FF3F-4DE6-BE5D-B0642A721E0E}"/>
+              </a:ext>
+            </a:extLst>
+          </p:cNvPr>
+          <p:cNvSpPr txBox="1"/>
+          <p:nvPr/>
+        </p:nvSpPr>
+        <p:spPr>
+          <a:xfrm>
+            <a:off x="7627222" y="5617893"/>
+            <a:ext cx="4161524" cy="369332"/>
+          </a:xfrm>
+          <a:prstGeom prst="rect">
+            <a:avLst/>
+          </a:prstGeom>
+          <a:noFill/>
+        </p:spPr>
+        <p:txBody>
+          <a:bodyPr wrap="none" rtlCol="0">
+            <a:spAutoFit/>
+          </a:bodyPr>
+          <a:lstStyle/>
+          <a:p>
+            <a:r>
+              <a:rPr lang="en-US" dirty="0" err="1"/>
+              <a:t>Lära</a:t>
+            </a:r>
+            <a:r>
+              <a:rPr lang="en-US" dirty="0"/>
+              <a:t> barn </a:t>
+            </a:r>
+            <a:r>
+              <a:rPr lang="en-US" dirty="0" err="1"/>
+              <a:t>respektera</a:t>
+            </a:r>
+            <a:r>
+              <a:rPr lang="en-US" dirty="0"/>
+              <a:t> sig </a:t>
+            </a:r>
+            <a:r>
+              <a:rPr lang="en-US" dirty="0" err="1"/>
+              <a:t>själv</a:t>
+            </a:r>
+            <a:r>
+              <a:rPr lang="en-US" dirty="0"/>
+              <a:t> </a:t>
+            </a:r>
+            <a:r>
+              <a:rPr lang="en-US" dirty="0" err="1"/>
+              <a:t>och</a:t>
+            </a:r>
+            <a:r>
+              <a:rPr lang="en-US" dirty="0"/>
+              <a:t> </a:t>
+            </a:r>
+            <a:r>
+              <a:rPr lang="en-US" dirty="0" err="1"/>
+              <a:t>varandra</a:t>
+            </a:r>
+            <a:endParaRPr lang="sv-SE" dirty="0"/>
+          </a:p>
+        </p:txBody>
+      </p:sp>
+      <p:sp>
+        <p:nvSpPr>
+          <p:cNvPr id="27" name="Rectangle 26">
+            <a:extLst>
+              <a:ext uri="{FF2B5EF4-FFF2-40B4-BE49-F238E27FC236}">
+                <a16:creationId xmlns:a16="http://schemas.microsoft.com/office/drawing/2014/main" id="{90D1589A-8808-4AEA-BA73-991B4A54F3F5}"/>
+              </a:ext>
+            </a:extLst>
+          </p:cNvPr>
+          <p:cNvSpPr/>
+          <p:nvPr/>
+        </p:nvSpPr>
+        <p:spPr>
+          <a:xfrm>
+            <a:off x="685126" y="1497391"/>
+            <a:ext cx="6096000" cy="523220"/>
+          </a:xfrm>
+          <a:prstGeom prst="rect">
+            <a:avLst/>
+          </a:prstGeom>
+        </p:spPr>
+        <p:txBody>
+          <a:bodyPr>
+            <a:spAutoFit/>
+          </a:bodyPr>
+          <a:lstStyle/>
+          <a:p>
+            <a:r>
+              <a:rPr lang="sv-SE" sz="1400" i="1" dirty="0">
+                <a:solidFill>
+                  <a:srgbClr val="000000"/>
+                </a:solidFill>
+                <a:latin typeface="HaboroSlab-NorLig"/>
+              </a:rPr>
+              <a:t>Oavsett kön lär vi dem att vi alla är </a:t>
+            </a:r>
+            <a:r>
+              <a:rPr lang="sv-SE" sz="1400" b="1" i="1" dirty="0">
+                <a:solidFill>
+                  <a:srgbClr val="000000"/>
+                </a:solidFill>
+                <a:latin typeface="HaboroSlab-NorLig"/>
+              </a:rPr>
+              <a:t>jämlika</a:t>
+            </a:r>
+            <a:r>
+              <a:rPr lang="sv-SE" sz="1400" i="1" dirty="0">
+                <a:solidFill>
+                  <a:srgbClr val="000000"/>
+                </a:solidFill>
+                <a:latin typeface="HaboroSlab-NorLig"/>
+              </a:rPr>
+              <a:t>, alla har </a:t>
+            </a:r>
+            <a:r>
+              <a:rPr lang="sv-SE" sz="1400" b="1" i="1" dirty="0">
+                <a:solidFill>
+                  <a:srgbClr val="000000"/>
+                </a:solidFill>
+                <a:latin typeface="HaboroSlab-NorLig"/>
+              </a:rPr>
+              <a:t>samma rättigheter</a:t>
+            </a:r>
+            <a:r>
+              <a:rPr lang="sv-SE" sz="1400" i="1" dirty="0">
+                <a:solidFill>
+                  <a:srgbClr val="000000"/>
+                </a:solidFill>
+                <a:latin typeface="HaboroSlab-NorLig"/>
+              </a:rPr>
+              <a:t>. Alla </a:t>
+            </a:r>
+            <a:r>
+              <a:rPr lang="sv-SE" sz="1400" b="1" i="1" dirty="0">
+                <a:solidFill>
+                  <a:srgbClr val="000000"/>
+                </a:solidFill>
+                <a:latin typeface="HaboroSlab-NorLig"/>
+              </a:rPr>
+              <a:t>bestämmer över sin kropp</a:t>
+            </a:r>
+            <a:r>
+              <a:rPr lang="sv-SE" sz="1400" i="1" dirty="0">
+                <a:solidFill>
+                  <a:srgbClr val="000000"/>
+                </a:solidFill>
+                <a:latin typeface="HaboroSlab-NorLig"/>
+              </a:rPr>
+              <a:t>. Alla har sitt </a:t>
+            </a:r>
+            <a:r>
+              <a:rPr lang="sv-SE" sz="1400" b="1" i="1" dirty="0">
+                <a:solidFill>
+                  <a:srgbClr val="000000"/>
+                </a:solidFill>
+                <a:latin typeface="HaboroSlab-NorLig"/>
+              </a:rPr>
+              <a:t>okränkbara värde</a:t>
+            </a:r>
+            <a:r>
+              <a:rPr lang="sv-SE" sz="1400" i="1" dirty="0">
+                <a:solidFill>
+                  <a:srgbClr val="000000"/>
+                </a:solidFill>
+                <a:latin typeface="HaboroSlab-NorLig"/>
+              </a:rPr>
+              <a:t>.</a:t>
+            </a:r>
+            <a:endParaRPr lang="sv-SE" sz="1400" i="1" dirty="0"/>
+          </a:p>
+        </p:txBody>
+      </p:sp>
+      <p:sp>
+        <p:nvSpPr>
+          <p:cNvPr id="28" name="TextBox 27">
+            <a:extLst>
+              <a:ext uri="{FF2B5EF4-FFF2-40B4-BE49-F238E27FC236}">
+                <a16:creationId xmlns:a16="http://schemas.microsoft.com/office/drawing/2014/main" id="{670B3E71-912D-4ED4-90D0-AA2A76643E52}"/>
+              </a:ext>
+            </a:extLst>
+          </p:cNvPr>
+          <p:cNvSpPr txBox="1"/>
+          <p:nvPr/>
+        </p:nvSpPr>
+        <p:spPr>
+          <a:xfrm>
+            <a:off x="10014127" y="2675022"/>
+            <a:ext cx="1743554" cy="369332"/>
+          </a:xfrm>
+          <a:prstGeom prst="rect">
+            <a:avLst/>
+          </a:prstGeom>
+          <a:noFill/>
+        </p:spPr>
+        <p:txBody>
+          <a:bodyPr wrap="none" rtlCol="0">
+            <a:spAutoFit/>
+          </a:bodyPr>
+          <a:lstStyle/>
+          <a:p>
+            <a:r>
+              <a:rPr lang="en-US" dirty="0" err="1"/>
+              <a:t>Vad</a:t>
+            </a:r>
+            <a:r>
+              <a:rPr lang="en-US" dirty="0"/>
+              <a:t> </a:t>
+            </a:r>
+            <a:r>
+              <a:rPr lang="en-US" dirty="0" err="1"/>
+              <a:t>är</a:t>
+            </a:r>
+            <a:r>
+              <a:rPr lang="en-US" dirty="0"/>
+              <a:t> </a:t>
+            </a:r>
+            <a:r>
+              <a:rPr lang="en-US" dirty="0" err="1"/>
+              <a:t>inte</a:t>
+            </a:r>
+            <a:r>
+              <a:rPr lang="en-US" dirty="0"/>
+              <a:t> </a:t>
+            </a:r>
+            <a:r>
+              <a:rPr lang="en-US" dirty="0" err="1"/>
+              <a:t>okej</a:t>
+            </a:r>
+            <a:r>
+              <a:rPr lang="en-US" dirty="0"/>
+              <a:t>?</a:t>
+            </a:r>
+            <a:endParaRPr lang="sv-SE" dirty="0"/>
+          </a:p>
+        </p:txBody>
+      </p:sp>
+      <p:sp>
+        <p:nvSpPr>
+          <p:cNvPr id="29" name="TextBox 28">
+            <a:extLst>
+              <a:ext uri="{FF2B5EF4-FFF2-40B4-BE49-F238E27FC236}">
+                <a16:creationId xmlns:a16="http://schemas.microsoft.com/office/drawing/2014/main" id="{F3AB92F6-4808-4C1B-A129-1AAB0408122D}"/>
+              </a:ext>
+            </a:extLst>
+          </p:cNvPr>
+          <p:cNvSpPr txBox="1"/>
+          <p:nvPr/>
+        </p:nvSpPr>
+        <p:spPr>
+          <a:xfrm>
+            <a:off x="6781126" y="2675022"/>
+            <a:ext cx="2582758" cy="369332"/>
+          </a:xfrm>
+          <a:prstGeom prst="rect">
+            <a:avLst/>
+          </a:prstGeom>
+          <a:noFill/>
+        </p:spPr>
+        <p:txBody>
+          <a:bodyPr wrap="none" rtlCol="0">
+            <a:spAutoFit/>
+          </a:bodyPr>
+          <a:lstStyle/>
+          <a:p>
+            <a:r>
+              <a:rPr lang="en-US" dirty="0" err="1"/>
+              <a:t>Hur</a:t>
+            </a:r>
+            <a:r>
+              <a:rPr lang="en-US" dirty="0"/>
+              <a:t> </a:t>
+            </a:r>
+            <a:r>
+              <a:rPr lang="en-US" dirty="0" err="1"/>
+              <a:t>vill</a:t>
+            </a:r>
+            <a:r>
+              <a:rPr lang="en-US" dirty="0"/>
+              <a:t> du </a:t>
+            </a:r>
+            <a:r>
+              <a:rPr lang="en-US" dirty="0" err="1"/>
+              <a:t>bli</a:t>
+            </a:r>
+            <a:r>
+              <a:rPr lang="en-US" dirty="0"/>
+              <a:t> </a:t>
+            </a:r>
+            <a:r>
+              <a:rPr lang="en-US" dirty="0" err="1"/>
+              <a:t>behandlad</a:t>
+            </a:r>
+            <a:r>
+              <a:rPr lang="en-US" dirty="0"/>
+              <a:t>?</a:t>
+            </a:r>
+            <a:endParaRPr lang="sv-SE" dirty="0"/>
+          </a:p>
+        </p:txBody>
+      </p:sp>
+      <p:sp>
+        <p:nvSpPr>
+          <p:cNvPr id="31" name="TextBox 30">
+            <a:extLst>
+              <a:ext uri="{FF2B5EF4-FFF2-40B4-BE49-F238E27FC236}">
+                <a16:creationId xmlns:a16="http://schemas.microsoft.com/office/drawing/2014/main" id="{0C39470F-6236-459D-BEF3-9343C6A481E5}"/>
+              </a:ext>
+            </a:extLst>
+          </p:cNvPr>
+          <p:cNvSpPr txBox="1"/>
+          <p:nvPr/>
+        </p:nvSpPr>
+        <p:spPr>
+          <a:xfrm>
+            <a:off x="10094918" y="3060032"/>
+            <a:ext cx="1581972" cy="369332"/>
+          </a:xfrm>
+          <a:prstGeom prst="rect">
+            <a:avLst/>
+          </a:prstGeom>
+          <a:noFill/>
+        </p:spPr>
+        <p:txBody>
+          <a:bodyPr wrap="none" rtlCol="0">
+            <a:spAutoFit/>
+          </a:bodyPr>
+          <a:lstStyle/>
+          <a:p>
+            <a:r>
+              <a:rPr lang="en-US" dirty="0" err="1"/>
+              <a:t>Våga</a:t>
+            </a:r>
+            <a:r>
+              <a:rPr lang="en-US" dirty="0"/>
+              <a:t> </a:t>
+            </a:r>
+            <a:r>
+              <a:rPr lang="en-US" dirty="0" err="1"/>
+              <a:t>säga</a:t>
+            </a:r>
+            <a:r>
+              <a:rPr lang="en-US" dirty="0"/>
+              <a:t> </a:t>
+            </a:r>
+            <a:r>
+              <a:rPr lang="en-US" dirty="0" err="1"/>
+              <a:t>ifrån</a:t>
+            </a:r>
+            <a:endParaRPr lang="en-US" dirty="0"/>
+          </a:p>
+        </p:txBody>
+      </p:sp>
+      <p:sp>
+        <p:nvSpPr>
+          <p:cNvPr id="32" name="TextBox 31">
+            <a:extLst>
+              <a:ext uri="{FF2B5EF4-FFF2-40B4-BE49-F238E27FC236}">
+                <a16:creationId xmlns:a16="http://schemas.microsoft.com/office/drawing/2014/main" id="{845BC4B1-2AA3-4F1E-B199-E8E9BDB5DBD8}"/>
+              </a:ext>
+            </a:extLst>
+          </p:cNvPr>
+          <p:cNvSpPr txBox="1"/>
+          <p:nvPr/>
+        </p:nvSpPr>
+        <p:spPr>
+          <a:xfrm>
+            <a:off x="6781126" y="3026249"/>
+            <a:ext cx="2347117" cy="369332"/>
+          </a:xfrm>
+          <a:prstGeom prst="rect">
+            <a:avLst/>
+          </a:prstGeom>
+          <a:noFill/>
+        </p:spPr>
+        <p:txBody>
+          <a:bodyPr wrap="none" rtlCol="0">
+            <a:spAutoFit/>
+          </a:bodyPr>
+          <a:lstStyle/>
+          <a:p>
+            <a:r>
+              <a:rPr lang="en-US" dirty="0" err="1"/>
+              <a:t>Hur</a:t>
+            </a:r>
+            <a:r>
+              <a:rPr lang="en-US" dirty="0"/>
+              <a:t> </a:t>
+            </a:r>
+            <a:r>
+              <a:rPr lang="en-US" dirty="0" err="1"/>
+              <a:t>blir</a:t>
+            </a:r>
+            <a:r>
+              <a:rPr lang="en-US" dirty="0"/>
+              <a:t> du </a:t>
+            </a:r>
+            <a:r>
+              <a:rPr lang="en-US" dirty="0" err="1"/>
+              <a:t>behandlad</a:t>
+            </a:r>
+            <a:r>
+              <a:rPr lang="en-US" dirty="0"/>
+              <a:t>?</a:t>
+            </a:r>
+            <a:endParaRPr lang="sv-SE" dirty="0"/>
+          </a:p>
+        </p:txBody>
+      </p:sp>
+      <p:sp>
+        <p:nvSpPr>
+          <p:cNvPr id="33" name="TextBox 32">
+            <a:extLst>
+              <a:ext uri="{FF2B5EF4-FFF2-40B4-BE49-F238E27FC236}">
+                <a16:creationId xmlns:a16="http://schemas.microsoft.com/office/drawing/2014/main" id="{34A1B37C-E86B-436E-B6E4-07273378F671}"/>
+              </a:ext>
+            </a:extLst>
+          </p:cNvPr>
+          <p:cNvSpPr txBox="1"/>
+          <p:nvPr/>
+        </p:nvSpPr>
+        <p:spPr>
+          <a:xfrm>
+            <a:off x="6781126" y="3386086"/>
+            <a:ext cx="2537939" cy="369332"/>
+          </a:xfrm>
+          <a:prstGeom prst="rect">
+            <a:avLst/>
+          </a:prstGeom>
+          <a:noFill/>
+        </p:spPr>
+        <p:txBody>
+          <a:bodyPr wrap="none" rtlCol="0">
+            <a:spAutoFit/>
+          </a:bodyPr>
+          <a:lstStyle/>
+          <a:p>
+            <a:r>
+              <a:rPr lang="en-US" dirty="0" err="1"/>
+              <a:t>Hur</a:t>
+            </a:r>
+            <a:r>
+              <a:rPr lang="en-US" dirty="0"/>
+              <a:t> </a:t>
+            </a:r>
+            <a:r>
+              <a:rPr lang="en-US" dirty="0" err="1"/>
+              <a:t>behandlar</a:t>
+            </a:r>
+            <a:r>
+              <a:rPr lang="en-US" dirty="0"/>
+              <a:t> du </a:t>
+            </a:r>
+            <a:r>
+              <a:rPr lang="en-US" dirty="0" err="1"/>
+              <a:t>andra</a:t>
+            </a:r>
+            <a:r>
+              <a:rPr lang="en-US" dirty="0"/>
+              <a:t>?</a:t>
+            </a:r>
+            <a:endParaRPr lang="sv-SE" dirty="0"/>
+          </a:p>
+        </p:txBody>
+      </p:sp>
+      <p:sp>
+        <p:nvSpPr>
+          <p:cNvPr id="34" name="TextBox 33">
+            <a:extLst>
+              <a:ext uri="{FF2B5EF4-FFF2-40B4-BE49-F238E27FC236}">
+                <a16:creationId xmlns:a16="http://schemas.microsoft.com/office/drawing/2014/main" id="{57C8EDA3-F57C-4C05-9087-C47B0B33AA3E}"/>
+              </a:ext>
+            </a:extLst>
+          </p:cNvPr>
+          <p:cNvSpPr txBox="1"/>
+          <p:nvPr/>
+        </p:nvSpPr>
+        <p:spPr>
+          <a:xfrm>
+            <a:off x="6781126" y="3737313"/>
+            <a:ext cx="3313792" cy="369332"/>
+          </a:xfrm>
+          <a:prstGeom prst="rect">
+            <a:avLst/>
+          </a:prstGeom>
+          <a:noFill/>
+        </p:spPr>
+        <p:txBody>
+          <a:bodyPr wrap="none" rtlCol="0">
+            <a:spAutoFit/>
+          </a:bodyPr>
+          <a:lstStyle/>
+          <a:p>
+            <a:r>
+              <a:rPr lang="en-US" dirty="0" err="1"/>
+              <a:t>Hur</a:t>
+            </a:r>
+            <a:r>
+              <a:rPr lang="en-US" dirty="0"/>
+              <a:t> </a:t>
+            </a:r>
+            <a:r>
+              <a:rPr lang="en-US" dirty="0" err="1"/>
+              <a:t>ser</a:t>
+            </a:r>
+            <a:r>
+              <a:rPr lang="en-US" dirty="0"/>
+              <a:t> du </a:t>
+            </a:r>
+            <a:r>
+              <a:rPr lang="en-US" dirty="0" err="1"/>
+              <a:t>andra</a:t>
+            </a:r>
+            <a:r>
+              <a:rPr lang="en-US" dirty="0"/>
+              <a:t> </a:t>
+            </a:r>
+            <a:r>
+              <a:rPr lang="en-US" dirty="0" err="1"/>
+              <a:t>bli</a:t>
+            </a:r>
+            <a:r>
+              <a:rPr lang="en-US" dirty="0"/>
+              <a:t> </a:t>
+            </a:r>
+            <a:r>
+              <a:rPr lang="en-US" dirty="0" err="1"/>
+              <a:t>behandlade</a:t>
+            </a:r>
+            <a:r>
+              <a:rPr lang="en-US" dirty="0"/>
+              <a:t>?</a:t>
+            </a:r>
+            <a:endParaRPr lang="sv-SE" dirty="0"/>
+          </a:p>
+        </p:txBody>
+      </p:sp>
+      <p:sp>
+        <p:nvSpPr>
+          <p:cNvPr id="35" name="TextBox 34">
+            <a:extLst>
+              <a:ext uri="{FF2B5EF4-FFF2-40B4-BE49-F238E27FC236}">
+                <a16:creationId xmlns:a16="http://schemas.microsoft.com/office/drawing/2014/main" id="{AFEABE7F-3249-4BEF-BF2E-21FC19E115B5}"/>
+              </a:ext>
+            </a:extLst>
+          </p:cNvPr>
+          <p:cNvSpPr txBox="1"/>
+          <p:nvPr/>
+        </p:nvSpPr>
+        <p:spPr>
+          <a:xfrm>
+            <a:off x="8190460" y="4305179"/>
+            <a:ext cx="2491131" cy="369332"/>
+          </a:xfrm>
+          <a:prstGeom prst="rect">
+            <a:avLst/>
+          </a:prstGeom>
+          <a:noFill/>
+        </p:spPr>
+        <p:txBody>
+          <a:bodyPr wrap="none" rtlCol="0">
+            <a:spAutoFit/>
+          </a:bodyPr>
+          <a:lstStyle/>
+          <a:p>
+            <a:r>
+              <a:rPr lang="en-US" dirty="0" err="1"/>
+              <a:t>Väcka</a:t>
+            </a:r>
+            <a:r>
+              <a:rPr lang="en-US" dirty="0"/>
+              <a:t> </a:t>
+            </a:r>
+            <a:r>
+              <a:rPr lang="en-US" dirty="0" err="1"/>
+              <a:t>diskussion</a:t>
+            </a:r>
+            <a:r>
+              <a:rPr lang="en-US" dirty="0"/>
+              <a:t> </a:t>
+            </a:r>
+            <a:r>
+              <a:rPr lang="en-US" dirty="0" err="1"/>
+              <a:t>i</a:t>
+            </a:r>
+            <a:r>
+              <a:rPr lang="en-US" dirty="0"/>
+              <a:t> </a:t>
+            </a:r>
+            <a:r>
+              <a:rPr lang="en-US" dirty="0" err="1"/>
+              <a:t>skolan</a:t>
+            </a:r>
+            <a:endParaRPr lang="sv-SE" dirty="0"/>
+          </a:p>
+        </p:txBody>
+      </p:sp>
+      <p:sp>
+        <p:nvSpPr>
+          <p:cNvPr id="36" name="Rectangle 35">
+            <a:extLst>
+              <a:ext uri="{FF2B5EF4-FFF2-40B4-BE49-F238E27FC236}">
+                <a16:creationId xmlns:a16="http://schemas.microsoft.com/office/drawing/2014/main" id="{7AC3DEC0-E42F-41F5-B2A3-5433CF32C1BA}"/>
+              </a:ext>
+            </a:extLst>
+          </p:cNvPr>
+          <p:cNvSpPr/>
+          <p:nvPr/>
+        </p:nvSpPr>
+        <p:spPr>
+          <a:xfrm>
+            <a:off x="685126" y="405068"/>
+            <a:ext cx="6096000" cy="954107"/>
+          </a:xfrm>
+          <a:prstGeom prst="rect">
+            <a:avLst/>
+          </a:prstGeom>
+        </p:spPr>
+        <p:txBody>
+          <a:bodyPr>
+            <a:spAutoFit/>
+          </a:bodyPr>
+          <a:lstStyle/>
+          <a:p>
+            <a:r>
+              <a:rPr lang="sv-SE" sz="1400" i="1" dirty="0">
+                <a:solidFill>
+                  <a:srgbClr val="29151A"/>
+                </a:solidFill>
+                <a:latin typeface="Arial" panose="020B0604020202020204" pitchFamily="34" charset="0"/>
+              </a:rPr>
+              <a:t>Arbetet med det förebyggande och främjande arbetet måste ske i klassrummen kontinuerligt för att motverka diskriminering och främja lika rättigheter och möjligheter till att alla behandlas lika i samhället. Sedan januari i år finns det </a:t>
+            </a:r>
+            <a:r>
+              <a:rPr lang="sv-SE" sz="1400" b="1" i="1" dirty="0">
+                <a:solidFill>
+                  <a:srgbClr val="0DA4B1"/>
+                </a:solidFill>
+                <a:latin typeface="Arial" panose="020B0604020202020204" pitchFamily="34" charset="0"/>
+                <a:hlinkClick r:id="rId4"/>
+              </a:rPr>
+              <a:t>en ny lag</a:t>
+            </a:r>
+            <a:r>
+              <a:rPr lang="sv-SE" sz="1400" i="1" dirty="0">
+                <a:solidFill>
+                  <a:srgbClr val="29151A"/>
+                </a:solidFill>
+                <a:latin typeface="Arial" panose="020B0604020202020204" pitchFamily="34" charset="0"/>
+              </a:rPr>
+              <a:t> som särskilt betonar detta arbetet.</a:t>
+            </a:r>
+            <a:endParaRPr lang="sv-SE" sz="1400" i="1" dirty="0"/>
+          </a:p>
+        </p:txBody>
+      </p:sp>
+      <p:sp>
+        <p:nvSpPr>
+          <p:cNvPr id="37" name="TextBox 36">
+            <a:extLst>
+              <a:ext uri="{FF2B5EF4-FFF2-40B4-BE49-F238E27FC236}">
+                <a16:creationId xmlns:a16="http://schemas.microsoft.com/office/drawing/2014/main" id="{3C7298F4-3C15-43BA-B65A-975A101B6414}"/>
+              </a:ext>
+            </a:extLst>
+          </p:cNvPr>
+          <p:cNvSpPr txBox="1"/>
+          <p:nvPr/>
+        </p:nvSpPr>
+        <p:spPr>
+          <a:xfrm>
+            <a:off x="8050095" y="2037388"/>
+            <a:ext cx="2812886" cy="369332"/>
+          </a:xfrm>
+          <a:prstGeom prst="rect">
+            <a:avLst/>
+          </a:prstGeom>
+          <a:noFill/>
+        </p:spPr>
+        <p:txBody>
+          <a:bodyPr wrap="none" rtlCol="0">
+            <a:spAutoFit/>
+          </a:bodyPr>
+          <a:lstStyle/>
+          <a:p>
+            <a:r>
+              <a:rPr lang="en-US" dirty="0" err="1"/>
+              <a:t>Förståelse</a:t>
+            </a:r>
+            <a:r>
+              <a:rPr lang="en-US" dirty="0"/>
+              <a:t> </a:t>
+            </a:r>
+            <a:r>
+              <a:rPr lang="en-US" dirty="0" err="1"/>
+              <a:t>kring</a:t>
+            </a:r>
+            <a:r>
+              <a:rPr lang="en-US" dirty="0"/>
+              <a:t> </a:t>
+            </a:r>
+            <a:r>
+              <a:rPr lang="en-US" dirty="0" err="1"/>
+              <a:t>kränkningar</a:t>
+            </a:r>
+            <a:endParaRPr lang="sv-SE" dirty="0"/>
+          </a:p>
+        </p:txBody>
+      </p:sp>
+      <p:pic>
+        <p:nvPicPr>
+          <p:cNvPr id="38" name="Picture 37">
+            <a:extLst>
+              <a:ext uri="{FF2B5EF4-FFF2-40B4-BE49-F238E27FC236}">
+                <a16:creationId xmlns:a16="http://schemas.microsoft.com/office/drawing/2014/main" id="{A30F9B02-0497-4B7B-8334-08CF27551190}"/>
+              </a:ext>
+            </a:extLst>
+          </p:cNvPr>
+          <p:cNvPicPr>
+            <a:picLocks noChangeAspect="1"/>
+          </p:cNvPicPr>
+          <p:nvPr/>
+        </p:nvPicPr>
+        <p:blipFill>
+          <a:blip r:embed="rId5"/>
+          <a:stretch>
+            <a:fillRect/>
+          </a:stretch>
+        </p:blipFill>
+        <p:spPr>
+          <a:xfrm>
+            <a:off x="642998" y="2290362"/>
+            <a:ext cx="2185118" cy="4188898"/>
+          </a:xfrm>
+          <a:prstGeom prst="rect">
+            <a:avLst/>
+          </a:prstGeom>
+        </p:spPr>
+      </p:pic>
+    </p:spTree>
+    <p:extLst>
+      <p:ext uri="{BB962C8B-B14F-4D97-AF65-F5344CB8AC3E}">
+        <p14:creationId xmlns:p14="http://schemas.microsoft.com/office/powerpoint/2010/main" val="2429294544"/>
       </p:ext>
     </p:extLst>
   </p:cSld>

</xml_diff>